<commit_message>
daily schedules for instructions
</commit_message>
<xml_diff>
--- a/assets/Menu_UI/Title.pptx
+++ b/assets/Menu_UI/Title.pptx
@@ -6236,8 +6236,25 @@
                 <a:latin typeface="Superclarendon Regular"/>
                 <a:cs typeface="Superclarendon Regular"/>
               </a:rPr>
-              <a:t>Pay attention to their wants and needs</a:t>
+              <a:t>Pay attention to their wants and </a:t>
             </a:r>
+            <a:r>
+              <a:rPr lang="en-US" smtClean="0">
+                <a:solidFill>
+                  <a:srgbClr val="FFFFFF"/>
+                </a:solidFill>
+                <a:latin typeface="Superclarendon Regular"/>
+                <a:cs typeface="Superclarendon Regular"/>
+              </a:rPr>
+              <a:t>daily schedules</a:t>
+            </a:r>
+            <a:endParaRPr lang="en-US" dirty="0" smtClean="0">
+              <a:solidFill>
+                <a:srgbClr val="FFFFFF"/>
+              </a:solidFill>
+              <a:latin typeface="Superclarendon Regular"/>
+              <a:cs typeface="Superclarendon Regular"/>
+            </a:endParaRPr>
           </a:p>
           <a:p>
             <a:endParaRPr lang="en-US" dirty="0" smtClean="0">

</xml_diff>